<commit_message>
Small fix in last slide
</commit_message>
<xml_diff>
--- a/accessibility-testing.pptx
+++ b/accessibility-testing.pptx
@@ -196,7 +196,8 @@
           <a:p>
             <a:fld id="{09F892E6-890F-42CB-BEDB-E27830372EC2}" type="datetimeFigureOut">
               <a:rPr lang="en-US" smtClean="0"/>
-              <a:t>11/15/2015</a:t>
+              <a:pPr/>
+              <a:t>11/16/2015</a:t>
             </a:fld>
             <a:endParaRPr lang="en-US"/>
           </a:p>
@@ -357,6 +358,7 @@
           <a:p>
             <a:fld id="{61FFF1C4-2ADC-4D99-B76B-57DA8D083313}" type="slidenum">
               <a:rPr lang="en-US" smtClean="0"/>
+              <a:pPr/>
               <a:t>‹#›</a:t>
             </a:fld>
             <a:endParaRPr lang="en-US"/>
@@ -596,10 +598,10 @@
               </a:rPr>
               <a:t>http://www.bbc.co.uk/guidelines/futuremedia/accessibility/</a:t>
             </a:r>
-            <a:endParaRPr lang="bg-BG" smtClean="0"/>
-          </a:p>
-          <a:p>
-            <a:endParaRPr lang="en-US"/>
+            <a:endParaRPr lang="bg-BG" dirty="0" smtClean="0"/>
+          </a:p>
+          <a:p>
+            <a:endParaRPr lang="en-US" dirty="0"/>
           </a:p>
         </p:txBody>
       </p:sp>
@@ -620,6 +622,7 @@
           <a:p>
             <a:fld id="{61FFF1C4-2ADC-4D99-B76B-57DA8D083313}" type="slidenum">
               <a:rPr lang="en-US" smtClean="0"/>
+              <a:pPr/>
               <a:t>1</a:t>
             </a:fld>
             <a:endParaRPr lang="en-US"/>
@@ -739,6 +742,7 @@
           <a:p>
             <a:fld id="{61FFF1C4-2ADC-4D99-B76B-57DA8D083313}" type="slidenum">
               <a:rPr lang="en-US" smtClean="0"/>
+              <a:pPr/>
               <a:t>5</a:t>
             </a:fld>
             <a:endParaRPr lang="en-US"/>
@@ -934,7 +938,8 @@
           <a:p>
             <a:fld id="{10856A5A-D2DF-4DA0-8837-73BD00D23457}" type="datetimeFigureOut">
               <a:rPr lang="en-US" smtClean="0"/>
-              <a:t>11/15/2015</a:t>
+              <a:pPr/>
+              <a:t>11/16/2015</a:t>
             </a:fld>
             <a:endParaRPr lang="en-US"/>
           </a:p>
@@ -976,6 +981,7 @@
           <a:p>
             <a:fld id="{5964269C-2189-47B6-9522-80FC03986505}" type="slidenum">
               <a:rPr lang="en-US" smtClean="0"/>
+              <a:pPr/>
               <a:t>‹#›</a:t>
             </a:fld>
             <a:endParaRPr lang="en-US"/>
@@ -1099,7 +1105,8 @@
           <a:p>
             <a:fld id="{10856A5A-D2DF-4DA0-8837-73BD00D23457}" type="datetimeFigureOut">
               <a:rPr lang="en-US" smtClean="0"/>
-              <a:t>11/15/2015</a:t>
+              <a:pPr/>
+              <a:t>11/16/2015</a:t>
             </a:fld>
             <a:endParaRPr lang="en-US"/>
           </a:p>
@@ -1141,6 +1148,7 @@
           <a:p>
             <a:fld id="{5964269C-2189-47B6-9522-80FC03986505}" type="slidenum">
               <a:rPr lang="en-US" smtClean="0"/>
+              <a:pPr/>
               <a:t>‹#›</a:t>
             </a:fld>
             <a:endParaRPr lang="en-US"/>
@@ -1274,7 +1282,8 @@
           <a:p>
             <a:fld id="{10856A5A-D2DF-4DA0-8837-73BD00D23457}" type="datetimeFigureOut">
               <a:rPr lang="en-US" smtClean="0"/>
-              <a:t>11/15/2015</a:t>
+              <a:pPr/>
+              <a:t>11/16/2015</a:t>
             </a:fld>
             <a:endParaRPr lang="en-US"/>
           </a:p>
@@ -1316,6 +1325,7 @@
           <a:p>
             <a:fld id="{5964269C-2189-47B6-9522-80FC03986505}" type="slidenum">
               <a:rPr lang="en-US" smtClean="0"/>
+              <a:pPr/>
               <a:t>‹#›</a:t>
             </a:fld>
             <a:endParaRPr lang="en-US"/>
@@ -1439,7 +1449,8 @@
           <a:p>
             <a:fld id="{10856A5A-D2DF-4DA0-8837-73BD00D23457}" type="datetimeFigureOut">
               <a:rPr lang="en-US" smtClean="0"/>
-              <a:t>11/15/2015</a:t>
+              <a:pPr/>
+              <a:t>11/16/2015</a:t>
             </a:fld>
             <a:endParaRPr lang="en-US"/>
           </a:p>
@@ -1481,6 +1492,7 @@
           <a:p>
             <a:fld id="{5964269C-2189-47B6-9522-80FC03986505}" type="slidenum">
               <a:rPr lang="en-US" smtClean="0"/>
+              <a:pPr/>
               <a:t>‹#›</a:t>
             </a:fld>
             <a:endParaRPr lang="en-US"/>
@@ -1680,7 +1692,8 @@
           <a:p>
             <a:fld id="{10856A5A-D2DF-4DA0-8837-73BD00D23457}" type="datetimeFigureOut">
               <a:rPr lang="en-US" smtClean="0"/>
-              <a:t>11/15/2015</a:t>
+              <a:pPr/>
+              <a:t>11/16/2015</a:t>
             </a:fld>
             <a:endParaRPr lang="en-US"/>
           </a:p>
@@ -1722,6 +1735,7 @@
           <a:p>
             <a:fld id="{5964269C-2189-47B6-9522-80FC03986505}" type="slidenum">
               <a:rPr lang="en-US" smtClean="0"/>
+              <a:pPr/>
               <a:t>‹#›</a:t>
             </a:fld>
             <a:endParaRPr lang="en-US"/>
@@ -1963,7 +1977,8 @@
           <a:p>
             <a:fld id="{10856A5A-D2DF-4DA0-8837-73BD00D23457}" type="datetimeFigureOut">
               <a:rPr lang="en-US" smtClean="0"/>
-              <a:t>11/15/2015</a:t>
+              <a:pPr/>
+              <a:t>11/16/2015</a:t>
             </a:fld>
             <a:endParaRPr lang="en-US"/>
           </a:p>
@@ -2005,6 +2020,7 @@
           <a:p>
             <a:fld id="{5964269C-2189-47B6-9522-80FC03986505}" type="slidenum">
               <a:rPr lang="en-US" smtClean="0"/>
+              <a:pPr/>
               <a:t>‹#›</a:t>
             </a:fld>
             <a:endParaRPr lang="en-US"/>
@@ -2380,7 +2396,8 @@
           <a:p>
             <a:fld id="{10856A5A-D2DF-4DA0-8837-73BD00D23457}" type="datetimeFigureOut">
               <a:rPr lang="en-US" smtClean="0"/>
-              <a:t>11/15/2015</a:t>
+              <a:pPr/>
+              <a:t>11/16/2015</a:t>
             </a:fld>
             <a:endParaRPr lang="en-US"/>
           </a:p>
@@ -2422,6 +2439,7 @@
           <a:p>
             <a:fld id="{5964269C-2189-47B6-9522-80FC03986505}" type="slidenum">
               <a:rPr lang="en-US" smtClean="0"/>
+              <a:pPr/>
               <a:t>‹#›</a:t>
             </a:fld>
             <a:endParaRPr lang="en-US"/>
@@ -2493,7 +2511,8 @@
           <a:p>
             <a:fld id="{10856A5A-D2DF-4DA0-8837-73BD00D23457}" type="datetimeFigureOut">
               <a:rPr lang="en-US" smtClean="0"/>
-              <a:t>11/15/2015</a:t>
+              <a:pPr/>
+              <a:t>11/16/2015</a:t>
             </a:fld>
             <a:endParaRPr lang="en-US"/>
           </a:p>
@@ -2535,6 +2554,7 @@
           <a:p>
             <a:fld id="{5964269C-2189-47B6-9522-80FC03986505}" type="slidenum">
               <a:rPr lang="en-US" smtClean="0"/>
+              <a:pPr/>
               <a:t>‹#›</a:t>
             </a:fld>
             <a:endParaRPr lang="en-US"/>
@@ -2583,7 +2603,8 @@
           <a:p>
             <a:fld id="{10856A5A-D2DF-4DA0-8837-73BD00D23457}" type="datetimeFigureOut">
               <a:rPr lang="en-US" smtClean="0"/>
-              <a:t>11/15/2015</a:t>
+              <a:pPr/>
+              <a:t>11/16/2015</a:t>
             </a:fld>
             <a:endParaRPr lang="en-US"/>
           </a:p>
@@ -2625,6 +2646,7 @@
           <a:p>
             <a:fld id="{5964269C-2189-47B6-9522-80FC03986505}" type="slidenum">
               <a:rPr lang="en-US" smtClean="0"/>
+              <a:pPr/>
               <a:t>‹#›</a:t>
             </a:fld>
             <a:endParaRPr lang="en-US"/>
@@ -2855,7 +2877,8 @@
           <a:p>
             <a:fld id="{10856A5A-D2DF-4DA0-8837-73BD00D23457}" type="datetimeFigureOut">
               <a:rPr lang="en-US" smtClean="0"/>
-              <a:t>11/15/2015</a:t>
+              <a:pPr/>
+              <a:t>11/16/2015</a:t>
             </a:fld>
             <a:endParaRPr lang="en-US"/>
           </a:p>
@@ -2897,6 +2920,7 @@
           <a:p>
             <a:fld id="{5964269C-2189-47B6-9522-80FC03986505}" type="slidenum">
               <a:rPr lang="en-US" smtClean="0"/>
+              <a:pPr/>
               <a:t>‹#›</a:t>
             </a:fld>
             <a:endParaRPr lang="en-US"/>
@@ -3103,7 +3127,8 @@
           <a:p>
             <a:fld id="{10856A5A-D2DF-4DA0-8837-73BD00D23457}" type="datetimeFigureOut">
               <a:rPr lang="en-US" smtClean="0"/>
-              <a:t>11/15/2015</a:t>
+              <a:pPr/>
+              <a:t>11/16/2015</a:t>
             </a:fld>
             <a:endParaRPr lang="en-US"/>
           </a:p>
@@ -3145,6 +3170,7 @@
           <a:p>
             <a:fld id="{5964269C-2189-47B6-9522-80FC03986505}" type="slidenum">
               <a:rPr lang="en-US" smtClean="0"/>
+              <a:pPr/>
               <a:t>‹#›</a:t>
             </a:fld>
             <a:endParaRPr lang="en-US"/>
@@ -3311,7 +3337,8 @@
           <a:p>
             <a:fld id="{10856A5A-D2DF-4DA0-8837-73BD00D23457}" type="datetimeFigureOut">
               <a:rPr lang="en-US" smtClean="0"/>
-              <a:t>11/15/2015</a:t>
+              <a:pPr/>
+              <a:t>11/16/2015</a:t>
             </a:fld>
             <a:endParaRPr lang="en-US"/>
           </a:p>
@@ -3389,6 +3416,7 @@
           <a:p>
             <a:fld id="{5964269C-2189-47B6-9522-80FC03986505}" type="slidenum">
               <a:rPr lang="en-US" smtClean="0"/>
+              <a:pPr/>
               <a:t>‹#›</a:t>
             </a:fld>
             <a:endParaRPr lang="en-US"/>
@@ -3874,7 +3902,6 @@
               <a:rPr lang="en-US" dirty="0" smtClean="0"/>
               <a:t>Type of functional testing</a:t>
             </a:r>
-            <a:endParaRPr lang="en-US" dirty="0" smtClean="0"/>
           </a:p>
           <a:p>
             <a:pPr lvl="1">
@@ -4055,11 +4082,18 @@
             </a:r>
             <a:r>
               <a:rPr lang="en-US" dirty="0"/>
-              <a:t> and NOT just limited to disabled people. These include</a:t>
+              <a:t> and NOT just limited to disabled people. These </a:t>
             </a:r>
             <a:r>
               <a:rPr lang="en-US" dirty="0" smtClean="0"/>
-              <a:t>:</a:t>
+              <a:t>include:</a:t>
+            </a:r>
+          </a:p>
+          <a:p>
+            <a:pPr lvl="1"/>
+            <a:r>
+              <a:rPr lang="en-US" dirty="0" smtClean="0"/>
+              <a:t>Users with Physical Impairment</a:t>
             </a:r>
           </a:p>
           <a:p>
@@ -4104,17 +4138,6 @@
             <a:r>
               <a:rPr lang="en-US" dirty="0"/>
               <a:t>, who are using NON-Standard Equipment</a:t>
-            </a:r>
-          </a:p>
-          <a:p>
-            <a:pPr lvl="1"/>
-            <a:r>
-              <a:rPr lang="en-US" dirty="0" smtClean="0"/>
-              <a:t> Users</a:t>
-            </a:r>
-            <a:r>
-              <a:rPr lang="en-US" dirty="0"/>
-              <a:t>, who are having restricted access</a:t>
             </a:r>
           </a:p>
           <a:p>
@@ -4404,7 +4427,7 @@
           <a:p>
             <a:r>
               <a:rPr lang="en-US" dirty="0" smtClean="0"/>
-              <a:t>Accessibility Requirements Example</a:t>
+              <a:t>The Simplest Web Accessibility Tests Anyone Can Do</a:t>
             </a:r>
             <a:endParaRPr lang="en-US" dirty="0"/>
           </a:p>
@@ -4425,369 +4448,102 @@
           <a:bodyPr/>
           <a:lstStyle/>
           <a:p>
+            <a:pPr marL="514350" indent="-514350">
+              <a:buNone/>
+            </a:pPr>
             <a:r>
               <a:rPr lang="en-US" dirty="0" smtClean="0"/>
-              <a:t>An example of an accessibility requirement could look like this:</a:t>
-            </a:r>
-          </a:p>
-          <a:p>
+              <a:t>1. Unplug </a:t>
+            </a:r>
+            <a:r>
+              <a:rPr lang="en-US" dirty="0" smtClean="0"/>
+              <a:t>your mouse </a:t>
+            </a:r>
+          </a:p>
+          <a:p>
+            <a:pPr marL="514350" indent="-514350">
+              <a:buNone/>
+            </a:pPr>
+            <a:r>
+              <a:rPr lang="en-US" dirty="0" smtClean="0"/>
+              <a:t>	- </a:t>
+            </a:r>
+            <a:r>
+              <a:rPr lang="en-US" i="1" dirty="0" smtClean="0"/>
+              <a:t>Interact with the site using only the keyboard?</a:t>
+            </a:r>
+          </a:p>
+          <a:p>
+            <a:pPr marL="514350" indent="-514350">
+              <a:buNone/>
+            </a:pPr>
+            <a:r>
+              <a:rPr lang="en-US" dirty="0" smtClean="0"/>
+              <a:t>2. Turn off Images</a:t>
+            </a:r>
+          </a:p>
+          <a:p>
+            <a:pPr marL="514350" indent="-514350">
+              <a:buNone/>
+            </a:pPr>
+            <a:r>
+              <a:rPr lang="en-US" dirty="0" smtClean="0"/>
+              <a:t>	- Does the content make sense?</a:t>
+            </a:r>
+          </a:p>
+          <a:p>
+            <a:pPr marL="514350" indent="-514350">
+              <a:buNone/>
+            </a:pPr>
+            <a:r>
+              <a:rPr lang="en-US" dirty="0" smtClean="0"/>
+              <a:t>3. Check for Captions or Transcripts</a:t>
+            </a:r>
+          </a:p>
+          <a:p>
+            <a:pPr marL="514350" indent="-514350">
+              <a:buNone/>
+            </a:pPr>
+            <a:r>
+              <a:rPr lang="en-US" dirty="0" smtClean="0"/>
+              <a:t>4. Click on Field Labels</a:t>
+            </a:r>
+          </a:p>
+          <a:p>
+            <a:pPr marL="514350" indent="-514350">
+              <a:buNone/>
+            </a:pPr>
+            <a:endParaRPr lang="en-US" dirty="0" smtClean="0"/>
+          </a:p>
+          <a:p>
+            <a:pPr marL="514350" indent="-514350">
+              <a:buNone/>
+            </a:pPr>
+            <a:endParaRPr lang="en-US" dirty="0" smtClean="0"/>
+          </a:p>
+          <a:p>
+            <a:pPr marL="514350" indent="-514350">
+              <a:buNone/>
+            </a:pPr>
+            <a:endParaRPr lang="en-US" dirty="0" smtClean="0"/>
+          </a:p>
+          <a:p>
+            <a:pPr marL="514350" indent="-514350">
+              <a:buNone/>
+            </a:pPr>
+            <a:endParaRPr lang="en-US" dirty="0" smtClean="0"/>
+          </a:p>
+          <a:p>
+            <a:pPr marL="514350" indent="-514350">
+              <a:buNone/>
+            </a:pPr>
+            <a:endParaRPr lang="en-US" dirty="0" smtClean="0"/>
+          </a:p>
+          <a:p>
+            <a:pPr>
+              <a:buNone/>
+            </a:pPr>
             <a:endParaRPr lang="en-US" dirty="0"/>
-          </a:p>
-        </p:txBody>
-      </p:sp>
-      <p:sp>
-        <p:nvSpPr>
-          <p:cNvPr id="4" name="Rectangle 3"/>
-          <p:cNvSpPr txBox="1">
-            <a:spLocks noChangeArrowheads="1"/>
-          </p:cNvSpPr>
-          <p:nvPr/>
-        </p:nvSpPr>
-        <p:spPr>
-          <a:xfrm>
-            <a:off x="467544" y="3284984"/>
-            <a:ext cx="8458200" cy="2631490"/>
-          </a:xfrm>
-          <a:prstGeom prst="rect">
-            <a:avLst/>
-          </a:prstGeom>
-          <a:solidFill>
-            <a:schemeClr val="accent5">
-              <a:lumMod val="40000"/>
-              <a:lumOff val="60000"/>
-              <a:alpha val="15000"/>
-            </a:schemeClr>
-          </a:solidFill>
-          <a:ln w="12700">
-            <a:solidFill>
-              <a:schemeClr val="accent5">
-                <a:lumMod val="60000"/>
-                <a:lumOff val="40000"/>
-              </a:schemeClr>
-            </a:solidFill>
-          </a:ln>
-        </p:spPr>
-        <p:txBody>
-          <a:bodyPr wrap="square">
-            <a:spAutoFit/>
-          </a:bodyPr>
-          <a:lstStyle>
-            <a:lvl1pPr marL="282575" indent="-282575" algn="l" rtl="0" eaLnBrk="0" fontAlgn="base" hangingPunct="0">
-              <a:lnSpc>
-                <a:spcPts val="3800"/>
-              </a:lnSpc>
-              <a:spcBef>
-                <a:spcPts val="600"/>
-              </a:spcBef>
-              <a:spcAft>
-                <a:spcPts val="600"/>
-              </a:spcAft>
-              <a:buClr>
-                <a:schemeClr val="accent5">
-                  <a:lumMod val="40000"/>
-                  <a:lumOff val="60000"/>
-                </a:schemeClr>
-              </a:buClr>
-              <a:buSzPct val="70000"/>
-              <a:buFont typeface="Wingdings 2" pitchFamily="18" charset="2"/>
-              <a:buChar char=""/>
-              <a:tabLst>
-                <a:tab pos="282575" algn="l"/>
-              </a:tabLst>
-              <a:defRPr sz="3200" b="1" kern="1200">
-                <a:solidFill>
-                  <a:srgbClr val="EBFFD2"/>
-                </a:solidFill>
-                <a:effectLst>
-                  <a:outerShdw blurRad="38100" dist="38100" dir="2700000" algn="tl">
-                    <a:srgbClr val="000000">
-                      <a:alpha val="43137"/>
-                    </a:srgbClr>
-                  </a:outerShdw>
-                </a:effectLst>
-                <a:latin typeface="+mn-lt"/>
-                <a:ea typeface="+mn-ea"/>
-                <a:cs typeface="+mn-cs"/>
-              </a:defRPr>
-            </a:lvl1pPr>
-            <a:lvl2pPr marL="630238" indent="-273050" algn="l" rtl="0" eaLnBrk="0" fontAlgn="base" hangingPunct="0">
-              <a:lnSpc>
-                <a:spcPts val="3800"/>
-              </a:lnSpc>
-              <a:spcBef>
-                <a:spcPts val="600"/>
-              </a:spcBef>
-              <a:spcAft>
-                <a:spcPts val="600"/>
-              </a:spcAft>
-              <a:buClr>
-                <a:srgbClr val="8FD600"/>
-              </a:buClr>
-              <a:buFont typeface="Wingdings 2" pitchFamily="18" charset="2"/>
-              <a:buChar char=""/>
-              <a:defRPr sz="3000" b="1" kern="1200">
-                <a:solidFill>
-                  <a:schemeClr val="tx1">
-                    <a:lumMod val="40000"/>
-                    <a:lumOff val="60000"/>
-                  </a:schemeClr>
-                </a:solidFill>
-                <a:effectLst>
-                  <a:outerShdw blurRad="38100" dist="38100" dir="2700000" algn="tl">
-                    <a:srgbClr val="000000">
-                      <a:alpha val="43137"/>
-                    </a:srgbClr>
-                  </a:outerShdw>
-                </a:effectLst>
-                <a:latin typeface="+mn-lt"/>
-                <a:ea typeface="+mn-ea"/>
-                <a:cs typeface="+mn-cs"/>
-              </a:defRPr>
-            </a:lvl2pPr>
-            <a:lvl3pPr marL="922338" indent="-273050" algn="l" rtl="0" eaLnBrk="0" fontAlgn="base" hangingPunct="0">
-              <a:lnSpc>
-                <a:spcPts val="3800"/>
-              </a:lnSpc>
-              <a:spcBef>
-                <a:spcPts val="600"/>
-              </a:spcBef>
-              <a:spcAft>
-                <a:spcPts val="600"/>
-              </a:spcAft>
-              <a:buClr>
-                <a:srgbClr val="FFAD9F"/>
-              </a:buClr>
-              <a:buFont typeface="Wingdings 2" pitchFamily="18" charset="2"/>
-              <a:buChar char=""/>
-              <a:defRPr sz="2800" b="1" kern="1200">
-                <a:solidFill>
-                  <a:srgbClr val="F5FFC2"/>
-                </a:solidFill>
-                <a:effectLst>
-                  <a:outerShdw blurRad="38100" dist="38100" dir="2700000" algn="tl">
-                    <a:srgbClr val="000000">
-                      <a:alpha val="43137"/>
-                    </a:srgbClr>
-                  </a:outerShdw>
-                </a:effectLst>
-                <a:latin typeface="+mn-lt"/>
-                <a:ea typeface="+mn-ea"/>
-                <a:cs typeface="+mn-cs"/>
-              </a:defRPr>
-            </a:lvl3pPr>
-            <a:lvl4pPr marL="1187450" indent="-228600" algn="l" rtl="0" eaLnBrk="0" fontAlgn="base" hangingPunct="0">
-              <a:lnSpc>
-                <a:spcPts val="3800"/>
-              </a:lnSpc>
-              <a:spcBef>
-                <a:spcPts val="600"/>
-              </a:spcBef>
-              <a:spcAft>
-                <a:spcPts val="600"/>
-              </a:spcAft>
-              <a:buClr>
-                <a:srgbClr val="FACF82"/>
-              </a:buClr>
-              <a:buFont typeface="Wingdings 2" pitchFamily="18" charset="2"/>
-              <a:buChar char=""/>
-              <a:defRPr sz="2600" b="1" kern="1200">
-                <a:solidFill>
-                  <a:schemeClr val="tx1">
-                    <a:lumMod val="40000"/>
-                    <a:lumOff val="60000"/>
-                  </a:schemeClr>
-                </a:solidFill>
-                <a:effectLst>
-                  <a:outerShdw blurRad="38100" dist="38100" dir="2700000" algn="tl">
-                    <a:srgbClr val="000000">
-                      <a:alpha val="43137"/>
-                    </a:srgbClr>
-                  </a:outerShdw>
-                </a:effectLst>
-                <a:latin typeface="+mn-lt"/>
-                <a:ea typeface="+mn-ea"/>
-                <a:cs typeface="+mn-cs"/>
-              </a:defRPr>
-            </a:lvl4pPr>
-            <a:lvl5pPr marL="1425575" indent="-228600" algn="l" rtl="0" eaLnBrk="0" fontAlgn="base" hangingPunct="0">
-              <a:lnSpc>
-                <a:spcPts val="3800"/>
-              </a:lnSpc>
-              <a:spcBef>
-                <a:spcPts val="600"/>
-              </a:spcBef>
-              <a:spcAft>
-                <a:spcPts val="600"/>
-              </a:spcAft>
-              <a:buClr>
-                <a:srgbClr val="46A6BD"/>
-              </a:buClr>
-              <a:buFont typeface="Wingdings 2" pitchFamily="18" charset="2"/>
-              <a:buChar char=""/>
-              <a:defRPr sz="2400" b="1" kern="1200">
-                <a:solidFill>
-                  <a:schemeClr val="tx1">
-                    <a:lumMod val="40000"/>
-                    <a:lumOff val="60000"/>
-                  </a:schemeClr>
-                </a:solidFill>
-                <a:effectLst>
-                  <a:outerShdw blurRad="38100" dist="38100" dir="2700000" algn="tl">
-                    <a:srgbClr val="000000">
-                      <a:alpha val="43137"/>
-                    </a:srgbClr>
-                  </a:outerShdw>
-                </a:effectLst>
-                <a:latin typeface="+mn-lt"/>
-                <a:ea typeface="+mn-ea"/>
-                <a:cs typeface="+mn-cs"/>
-              </a:defRPr>
-            </a:lvl5pPr>
-            <a:lvl6pPr marL="1673352" indent="-228600" algn="l" rtl="0" eaLnBrk="1" latinLnBrk="0" hangingPunct="1">
-              <a:spcBef>
-                <a:spcPct val="20000"/>
-              </a:spcBef>
-              <a:buClr>
-                <a:schemeClr val="accent6"/>
-              </a:buClr>
-              <a:buFont typeface="Wingdings 2"/>
-              <a:buChar char=""/>
-              <a:defRPr sz="1800" kern="1200">
-                <a:solidFill>
-                  <a:schemeClr val="tx1"/>
-                </a:solidFill>
-                <a:latin typeface="+mn-lt"/>
-                <a:ea typeface="+mn-ea"/>
-                <a:cs typeface="+mn-cs"/>
-              </a:defRPr>
-            </a:lvl6pPr>
-            <a:lvl7pPr marL="1911096" indent="-228600" algn="l" rtl="0" eaLnBrk="1" latinLnBrk="0" hangingPunct="1">
-              <a:spcBef>
-                <a:spcPct val="20000"/>
-              </a:spcBef>
-              <a:buClr>
-                <a:schemeClr val="tx2"/>
-              </a:buClr>
-              <a:buFont typeface="Wingdings 2"/>
-              <a:buChar char=""/>
-              <a:defRPr sz="1600" kern="1200">
-                <a:solidFill>
-                  <a:schemeClr val="tx1"/>
-                </a:solidFill>
-                <a:latin typeface="+mn-lt"/>
-                <a:ea typeface="+mn-ea"/>
-                <a:cs typeface="+mn-cs"/>
-              </a:defRPr>
-            </a:lvl7pPr>
-            <a:lvl8pPr marL="2121408" indent="-182880" algn="l" rtl="0" eaLnBrk="1" latinLnBrk="0" hangingPunct="1">
-              <a:spcBef>
-                <a:spcPct val="20000"/>
-              </a:spcBef>
-              <a:buClr>
-                <a:schemeClr val="tx2"/>
-              </a:buClr>
-              <a:buFont typeface="Wingdings 2"/>
-              <a:buChar char=""/>
-              <a:defRPr sz="1400" kern="1200">
-                <a:solidFill>
-                  <a:schemeClr val="tx1"/>
-                </a:solidFill>
-                <a:latin typeface="+mn-lt"/>
-                <a:ea typeface="+mn-ea"/>
-                <a:cs typeface="+mn-cs"/>
-              </a:defRPr>
-            </a:lvl8pPr>
-            <a:lvl9pPr marL="2322576" indent="-182880" algn="l" rtl="0" eaLnBrk="1" latinLnBrk="0" hangingPunct="1">
-              <a:spcBef>
-                <a:spcPct val="20000"/>
-              </a:spcBef>
-              <a:buClr>
-                <a:schemeClr val="tx2"/>
-              </a:buClr>
-              <a:buFont typeface="Wingdings 2"/>
-              <a:buChar char=""/>
-              <a:defRPr sz="1400" kern="1200">
-                <a:solidFill>
-                  <a:schemeClr val="tx1"/>
-                </a:solidFill>
-                <a:latin typeface="+mn-lt"/>
-                <a:ea typeface="+mn-ea"/>
-                <a:cs typeface="+mn-cs"/>
-              </a:defRPr>
-            </a:lvl9pPr>
-          </a:lstStyle>
-          <a:p>
-            <a:pPr marL="0" indent="0" algn="just">
-              <a:lnSpc>
-                <a:spcPct val="110000"/>
-              </a:lnSpc>
-              <a:spcBef>
-                <a:spcPts val="0"/>
-              </a:spcBef>
-              <a:spcAft>
-                <a:spcPct val="0"/>
-              </a:spcAft>
-              <a:buFontTx/>
-              <a:buNone/>
-            </a:pPr>
-            <a:r>
-              <a:rPr lang="en-US" sz="3000" noProof="1" smtClean="0">
-                <a:solidFill>
-                  <a:schemeClr val="tx1">
-                    <a:lumMod val="20000"/>
-                    <a:lumOff val="80000"/>
-                  </a:schemeClr>
-                </a:solidFill>
-                <a:cs typeface="Consolas" pitchFamily="49" charset="0"/>
-              </a:rPr>
-              <a:t> </a:t>
-            </a:r>
-            <a:r>
-              <a:rPr lang="en-US" sz="3000" b="0" noProof="1" smtClean="0">
-                <a:solidFill>
-                  <a:schemeClr val="tx1"/>
-                </a:solidFill>
-                <a:cs typeface="Consolas" pitchFamily="49" charset="0"/>
-              </a:rPr>
-              <a:t>  </a:t>
-            </a:r>
-            <a:r>
-              <a:rPr lang="en-US" sz="3000" noProof="1" smtClean="0">
-                <a:solidFill>
-                  <a:schemeClr val="tx1"/>
-                </a:solidFill>
-                <a:effectLst/>
-                <a:cs typeface="Consolas" pitchFamily="49" charset="0"/>
-              </a:rPr>
-              <a:t>When electronic forms are used, the form shall allow people using assistive technology to access the </a:t>
-            </a:r>
-            <a:r>
-              <a:rPr lang="en-US" sz="3000" noProof="1" smtClean="0">
-                <a:solidFill>
-                  <a:schemeClr val="tx1"/>
-                </a:solidFill>
-                <a:effectLst/>
-                <a:cs typeface="Consolas" pitchFamily="49" charset="0"/>
-              </a:rPr>
-              <a:t>information, field </a:t>
-            </a:r>
-            <a:r>
-              <a:rPr lang="en-US" sz="3000" noProof="1" smtClean="0">
-                <a:solidFill>
-                  <a:schemeClr val="tx1"/>
-                </a:solidFill>
-                <a:effectLst/>
-                <a:cs typeface="Consolas" pitchFamily="49" charset="0"/>
-              </a:rPr>
-              <a:t>elements, and functionality required for completion and submission of the form, including all directions and cues.</a:t>
-            </a:r>
-            <a:endParaRPr lang="bg-BG" sz="3000" noProof="1">
-              <a:solidFill>
-                <a:schemeClr val="tx1"/>
-              </a:solidFill>
-              <a:effectLst/>
-              <a:cs typeface="Consolas" pitchFamily="49" charset="0"/>
-            </a:endParaRPr>
           </a:p>
         </p:txBody>
       </p:sp>

</xml_diff>